<commit_message>
renamed the ITK-6 tutorial and updated a bunch of readmes
</commit_message>
<xml_diff>
--- a/01_Setup/01_Setup.pptx
+++ b/01_Setup/01_Setup.pptx
@@ -253,7 +253,7 @@
             <a:fld id="{B42BD323-5C00-4890-83E2-BEFAF6C3291A}" type="datetimeFigureOut">
               <a:rPr lang="en-US" smtClean="0"/>
               <a:pPr/>
-              <a:t>09-Mar-16</a:t>
+              <a:t>22-Aug-18</a:t>
             </a:fld>
             <a:endParaRPr lang="en-US"/>
           </a:p>
@@ -419,7 +419,7 @@
           <a:p>
             <a:fld id="{C9C9E540-6EA2-4601-82A4-5B8361C21D86}" type="datetimeFigureOut">
               <a:rPr lang="en-US" smtClean="0"/>
-              <a:t>09-Mar-16</a:t>
+              <a:t>22-Aug-18</a:t>
             </a:fld>
             <a:endParaRPr lang="en-US"/>
           </a:p>
@@ -1190,7 +1190,7 @@
             <a:fld id="{0B88B1FA-8344-4FB6-8A03-36B5BF2E4AAB}" type="datetimeFigureOut">
               <a:rPr lang="en-US" smtClean="0"/>
               <a:pPr/>
-              <a:t>09-Mar-16</a:t>
+              <a:t>22-Aug-18</a:t>
             </a:fld>
             <a:endParaRPr lang="en-US" dirty="0"/>
           </a:p>
@@ -1582,7 +1582,7 @@
             <a:fld id="{0B88B1FA-8344-4FB6-8A03-36B5BF2E4AAB}" type="datetimeFigureOut">
               <a:rPr lang="en-US" smtClean="0"/>
               <a:pPr/>
-              <a:t>09-Mar-16</a:t>
+              <a:t>22-Aug-18</a:t>
             </a:fld>
             <a:endParaRPr lang="en-US" dirty="0"/>
           </a:p>
@@ -2019,7 +2019,7 @@
             <a:fld id="{0B88B1FA-8344-4FB6-8A03-36B5BF2E4AAB}" type="datetimeFigureOut">
               <a:rPr lang="en-US" smtClean="0"/>
               <a:pPr/>
-              <a:t>09-Mar-16</a:t>
+              <a:t>22-Aug-18</a:t>
             </a:fld>
             <a:endParaRPr lang="en-US" dirty="0"/>
           </a:p>
@@ -2546,7 +2546,7 @@
             <a:fld id="{0B88B1FA-8344-4FB6-8A03-36B5BF2E4AAB}" type="datetimeFigureOut">
               <a:rPr lang="en-US" smtClean="0"/>
               <a:pPr/>
-              <a:t>09-Mar-16</a:t>
+              <a:t>22-Aug-18</a:t>
             </a:fld>
             <a:endParaRPr lang="en-US" dirty="0"/>
           </a:p>
@@ -3099,7 +3099,7 @@
             <a:fld id="{0B88B1FA-8344-4FB6-8A03-36B5BF2E4AAB}" type="datetimeFigureOut">
               <a:rPr lang="en-US" smtClean="0"/>
               <a:pPr/>
-              <a:t>09-Mar-16</a:t>
+              <a:t>22-Aug-18</a:t>
             </a:fld>
             <a:endParaRPr lang="en-US" dirty="0"/>
           </a:p>
@@ -3794,7 +3794,7 @@
             <a:fld id="{0B88B1FA-8344-4FB6-8A03-36B5BF2E4AAB}" type="datetimeFigureOut">
               <a:rPr lang="en-US" smtClean="0"/>
               <a:pPr/>
-              <a:t>09-Mar-16</a:t>
+              <a:t>22-Aug-18</a:t>
             </a:fld>
             <a:endParaRPr lang="en-US" dirty="0"/>
           </a:p>
@@ -4139,7 +4139,7 @@
             <a:fld id="{0B88B1FA-8344-4FB6-8A03-36B5BF2E4AAB}" type="datetimeFigureOut">
               <a:rPr lang="en-US" smtClean="0"/>
               <a:pPr/>
-              <a:t>09-Mar-16</a:t>
+              <a:t>22-Aug-18</a:t>
             </a:fld>
             <a:endParaRPr lang="en-US" dirty="0"/>
           </a:p>
@@ -4657,7 +4657,7 @@
             <a:fld id="{0B88B1FA-8344-4FB6-8A03-36B5BF2E4AAB}" type="datetimeFigureOut">
               <a:rPr lang="en-US" smtClean="0"/>
               <a:pPr/>
-              <a:t>09-Mar-16</a:t>
+              <a:t>22-Aug-18</a:t>
             </a:fld>
             <a:endParaRPr lang="en-US" dirty="0"/>
           </a:p>
@@ -5135,7 +5135,7 @@
             <a:fld id="{0B88B1FA-8344-4FB6-8A03-36B5BF2E4AAB}" type="datetimeFigureOut">
               <a:rPr lang="en-US" smtClean="0"/>
               <a:pPr/>
-              <a:t>09-Mar-16</a:t>
+              <a:t>22-Aug-18</a:t>
             </a:fld>
             <a:endParaRPr lang="en-US" dirty="0"/>
           </a:p>
@@ -5572,7 +5572,7 @@
             <a:fld id="{0B88B1FA-8344-4FB6-8A03-36B5BF2E4AAB}" type="datetimeFigureOut">
               <a:rPr lang="en-US" smtClean="0"/>
               <a:pPr/>
-              <a:t>09-Mar-16</a:t>
+              <a:t>22-Aug-18</a:t>
             </a:fld>
             <a:endParaRPr lang="en-US" dirty="0"/>
           </a:p>
@@ -5853,7 +5853,7 @@
             <a:fld id="{0B88B1FA-8344-4FB6-8A03-36B5BF2E4AAB}" type="datetimeFigureOut">
               <a:rPr lang="en-US" smtClean="0"/>
               <a:pPr/>
-              <a:t>09-Mar-16</a:t>
+              <a:t>22-Aug-18</a:t>
             </a:fld>
             <a:endParaRPr lang="en-US" dirty="0"/>
           </a:p>

</xml_diff>